<commit_message>
some small fixes to the presentation
</commit_message>
<xml_diff>
--- a/misc/Native Language Classification.pptx
+++ b/misc/Native Language Classification.pptx
@@ -115,6 +115,11 @@
       </a:defRPr>
     </a:lvl9pPr>
   </p:defaultTextStyle>
+  <p:extLst>
+    <p:ext uri="{EFAFB233-063F-42B5-8137-9DF3F51BA10A}">
+      <p15:sldGuideLst xmlns:p15="http://schemas.microsoft.com/office/powerpoint/2012/main"/>
+    </p:ext>
+  </p:extLst>
 </p:presentation>
 </file>
 
@@ -271,7 +276,7 @@
             <a:fld id="{E9462EF3-3C4F-43EE-ACEE-D4B806740EA3}" type="datetimeFigureOut">
               <a:rPr lang="en-US" smtClean="0"/>
               <a:pPr/>
-              <a:t>6/25/2018</a:t>
+              <a:t>6/26/2018</a:t>
             </a:fld>
             <a:endParaRPr lang="en-US" dirty="0"/>
           </a:p>
@@ -520,7 +525,7 @@
           <a:p>
             <a:fld id="{5568300E-C023-45CD-A0BE-EDB7A8C6EA8B}" type="datetimeFigureOut">
               <a:rPr lang="en-US" smtClean="0"/>
-              <a:t>6/25/2018</a:t>
+              <a:t>6/26/2018</a:t>
             </a:fld>
             <a:endParaRPr lang="en-US" dirty="0"/>
           </a:p>
@@ -706,7 +711,7 @@
           <a:p>
             <a:fld id="{3B620EAD-E369-4933-8469-ED7764B56A1B}" type="datetimeFigureOut">
               <a:rPr lang="en-US" smtClean="0"/>
-              <a:t>6/25/2018</a:t>
+              <a:t>6/26/2018</a:t>
             </a:fld>
             <a:endParaRPr lang="en-US" dirty="0"/>
           </a:p>
@@ -917,7 +922,7 @@
           <a:p>
             <a:fld id="{076C0EF2-9919-473B-8215-8616BAF10692}" type="datetimeFigureOut">
               <a:rPr lang="en-US" smtClean="0"/>
-              <a:t>6/25/2018</a:t>
+              <a:t>6/26/2018</a:t>
             </a:fld>
             <a:endParaRPr lang="en-US" dirty="0"/>
           </a:p>
@@ -1180,7 +1185,7 @@
           <a:p>
             <a:fld id="{A09472EB-AC54-4713-BFC2-BEB621108C63}" type="datetimeFigureOut">
               <a:rPr lang="en-US" smtClean="0"/>
-              <a:t>6/25/2018</a:t>
+              <a:t>6/26/2018</a:t>
             </a:fld>
             <a:endParaRPr lang="en-US" dirty="0"/>
           </a:p>
@@ -1533,7 +1538,7 @@
           <a:p>
             <a:fld id="{99455A0C-791E-4545-B787-F98AD45CD761}" type="datetimeFigureOut">
               <a:rPr lang="en-US" smtClean="0"/>
-              <a:t>6/25/2018</a:t>
+              <a:t>6/26/2018</a:t>
             </a:fld>
             <a:endParaRPr lang="en-US" dirty="0"/>
           </a:p>
@@ -1941,7 +1946,7 @@
           <a:p>
             <a:fld id="{42536B77-F4F4-4427-AC4F-9A623798AD82}" type="datetimeFigureOut">
               <a:rPr lang="en-US" smtClean="0"/>
-              <a:t>6/25/2018</a:t>
+              <a:t>6/26/2018</a:t>
             </a:fld>
             <a:endParaRPr lang="en-US" dirty="0"/>
           </a:p>
@@ -2065,7 +2070,7 @@
           <a:p>
             <a:fld id="{D8BE790C-34EB-4565-8437-CACF4CDB7822}" type="datetimeFigureOut">
               <a:rPr lang="en-US" smtClean="0"/>
-              <a:t>6/25/2018</a:t>
+              <a:t>6/26/2018</a:t>
             </a:fld>
             <a:endParaRPr lang="en-US" dirty="0"/>
           </a:p>
@@ -2166,7 +2171,7 @@
           <a:p>
             <a:fld id="{F84A4C11-22B8-4A4E-8126-B3AF6B948A8E}" type="datetimeFigureOut">
               <a:rPr lang="en-US" smtClean="0"/>
-              <a:t>6/25/2018</a:t>
+              <a:t>6/26/2018</a:t>
             </a:fld>
             <a:endParaRPr lang="en-US" dirty="0"/>
           </a:p>
@@ -2462,7 +2467,7 @@
           <a:p>
             <a:fld id="{16ED06B6-C816-4861-964D-15A98395707D}" type="datetimeFigureOut">
               <a:rPr lang="en-US" smtClean="0"/>
-              <a:t>6/25/2018</a:t>
+              <a:t>6/26/2018</a:t>
             </a:fld>
             <a:endParaRPr lang="en-US" dirty="0"/>
           </a:p>
@@ -2748,7 +2753,7 @@
           <a:p>
             <a:fld id="{00B1A8AB-EA7C-4B1B-9D73-E2551851FABE}" type="datetimeFigureOut">
               <a:rPr lang="en-US" smtClean="0"/>
-              <a:t>6/25/2018</a:t>
+              <a:t>6/26/2018</a:t>
             </a:fld>
             <a:endParaRPr lang="en-US" dirty="0"/>
           </a:p>
@@ -3007,7 +3012,7 @@
           <a:p>
             <a:fld id="{90786BE5-D2A3-4BF0-8B30-D7403E61B3DC}" type="datetimeFigureOut">
               <a:rPr lang="en-US" smtClean="0"/>
-              <a:t>6/25/2018</a:t>
+              <a:t>6/26/2018</a:t>
             </a:fld>
             <a:endParaRPr lang="en-US" dirty="0"/>
           </a:p>
@@ -3976,7 +3981,7 @@
             <p:ph idx="1"/>
             <p:extLst>
               <p:ext uri="{D42A27DB-BD31-4B8C-83A1-F6EECF244321}">
-                <p14:modId xmlns:p14="http://schemas.microsoft.com/office/powerpoint/2010/main" val="681479196"/>
+                <p14:modId xmlns:p14="http://schemas.microsoft.com/office/powerpoint/2010/main" val="127416208"/>
               </p:ext>
             </p:extLst>
           </p:nvPr>
@@ -4051,7 +4056,7 @@
                       <a:pPr algn="ctr" rtl="0"/>
                       <a:r>
                         <a:rPr lang="en-US" dirty="0"/>
-                        <a:t>Naïve Base</a:t>
+                        <a:t>Naïve Bayes</a:t>
                       </a:r>
                       <a:endParaRPr lang="he-IL" dirty="0"/>
                     </a:p>
@@ -5931,7 +5936,7 @@
           <p:nvPr>
             <p:extLst>
               <p:ext uri="{D42A27DB-BD31-4B8C-83A1-F6EECF244321}">
-                <p14:modId xmlns:p14="http://schemas.microsoft.com/office/powerpoint/2010/main" val="1711261068"/>
+                <p14:modId xmlns:p14="http://schemas.microsoft.com/office/powerpoint/2010/main" val="1600142460"/>
               </p:ext>
             </p:extLst>
           </p:nvPr>
@@ -6006,7 +6011,7 @@
                       <a:pPr algn="ctr" rtl="0"/>
                       <a:r>
                         <a:rPr lang="en-US" dirty="0"/>
-                        <a:t>Naïve Base</a:t>
+                        <a:t>Naïve Bayes</a:t>
                       </a:r>
                       <a:endParaRPr lang="he-IL" dirty="0"/>
                     </a:p>
@@ -7965,7 +7970,7 @@
         </p:nvSpPr>
         <p:spPr>
           <a:xfrm>
-            <a:off x="196947" y="2170088"/>
+            <a:off x="153571" y="1613535"/>
             <a:ext cx="2588457" cy="523220"/>
           </a:xfrm>
           <a:prstGeom prst="rect">
@@ -8001,7 +8006,7 @@
         </p:nvSpPr>
         <p:spPr>
           <a:xfrm>
-            <a:off x="196946" y="5214270"/>
+            <a:off x="302963" y="4260891"/>
             <a:ext cx="2588457" cy="523220"/>
           </a:xfrm>
           <a:prstGeom prst="rect">
@@ -8100,8 +8105,8 @@
         </p:nvSpPr>
         <p:spPr>
           <a:xfrm>
-            <a:off x="827180" y="2084832"/>
-            <a:ext cx="9442236" cy="4023360"/>
+            <a:off x="827179" y="2084832"/>
+            <a:ext cx="10092611" cy="4023360"/>
           </a:xfrm>
         </p:spPr>
         <p:txBody>
@@ -8111,21 +8116,14 @@
             <a:pPr algn="l"/>
             <a:r>
               <a:rPr lang="en-US" dirty="0"/>
-              <a:t>Function word approach yields inferior results compared to the bag of words approach. </a:t>
+              <a:t>Function word approach yields inferior results compared to the bag of words approach, Yet it achieve reasonable scores, and is robust in respect to domain and time. </a:t>
             </a:r>
             <a:br>
               <a:rPr lang="en-US" dirty="0"/>
             </a:br>
             <a:r>
               <a:rPr lang="en-US" dirty="0"/>
-              <a:t>Yet it achieve solid scores, and is robust in respect to domain and time. </a:t>
-            </a:r>
-            <a:br>
-              <a:rPr lang="en-US" dirty="0"/>
-            </a:br>
-            <a:r>
-              <a:rPr lang="en-US" dirty="0"/>
-              <a:t>The dimension of the feature vector remains constant. </a:t>
+              <a:t>In addition, the dimension of the feature vector remains constant. </a:t>
             </a:r>
             <a:br>
               <a:rPr lang="en-US" dirty="0"/>
@@ -8875,7 +8873,7 @@
             </a:pPr>
             <a:r>
               <a:rPr lang="en-US" sz="2000" dirty="0"/>
-              <a:t> We were interested in crating content independent classification model. </a:t>
+              <a:t> We were interested in creating content independent classification model. </a:t>
             </a:r>
           </a:p>
           <a:p>
@@ -9639,14 +9637,14 @@
           <a:lstStyle/>
           <a:p>
             <a:r>
-              <a:rPr lang="en-US">
+              <a:rPr lang="en-US" dirty="0">
                 <a:solidFill>
                   <a:srgbClr val="FFFFFF"/>
                 </a:solidFill>
               </a:rPr>
-              <a:t>Date sets &amp; Tools</a:t>
-            </a:r>
-            <a:endParaRPr lang="he-IL">
+              <a:t>Data sets &amp; Tools</a:t>
+            </a:r>
+            <a:endParaRPr lang="he-IL" dirty="0">
               <a:solidFill>
                 <a:srgbClr val="FFFFFF"/>
               </a:solidFill>
@@ -9706,7 +9704,7 @@
                   <a:srgbClr val="FFFFFF"/>
                 </a:solidFill>
               </a:rPr>
-              <a:t> Non-Native speakers dataset – TOFEL (Test Of English As A Foreign Language):</a:t>
+              <a:t> Non-Native speakers dataset – TOEFL (Test Of English As A Foreign Language):</a:t>
             </a:r>
             <a:br>
               <a:rPr lang="en-US" dirty="0">
@@ -10201,7 +10199,7 @@
             </a:pPr>
             <a:r>
               <a:rPr lang="en-US" sz="2400" dirty="0"/>
-              <a:t>Naive base:</a:t>
+              <a:t>Naive Bayes:</a:t>
             </a:r>
             <a:br>
               <a:rPr lang="en-US" sz="2000" dirty="0"/>

</xml_diff>